<commit_message>
Agigunte finestre e tastiera
</commit_message>
<xml_diff>
--- a/interfacce.pptx
+++ b/interfacce.pptx
@@ -15,6 +15,7 @@
     <p:sldId id="263" r:id="rId9"/>
     <p:sldId id="264" r:id="rId10"/>
     <p:sldId id="265" r:id="rId11"/>
+    <p:sldId id="266" r:id="rId12"/>
   </p:sldIdLst>
   <p:sldSz cx="12192000" cy="6858000"/>
   <p:notesSz cx="6858000" cy="9144000"/>
@@ -274,7 +275,7 @@
           <a:p>
             <a:fld id="{220F67BA-9CF1-48B0-BA9D-7DB2A7FE6C8C}" type="datetimeFigureOut">
               <a:rPr lang="it-IT" smtClean="0"/>
-              <a:t>05/08/2017</a:t>
+              <a:t>08/08/2017</a:t>
             </a:fld>
             <a:endParaRPr lang="it-IT"/>
           </a:p>
@@ -474,7 +475,7 @@
           <a:p>
             <a:fld id="{220F67BA-9CF1-48B0-BA9D-7DB2A7FE6C8C}" type="datetimeFigureOut">
               <a:rPr lang="it-IT" smtClean="0"/>
-              <a:t>05/08/2017</a:t>
+              <a:t>08/08/2017</a:t>
             </a:fld>
             <a:endParaRPr lang="it-IT"/>
           </a:p>
@@ -684,7 +685,7 @@
           <a:p>
             <a:fld id="{220F67BA-9CF1-48B0-BA9D-7DB2A7FE6C8C}" type="datetimeFigureOut">
               <a:rPr lang="it-IT" smtClean="0"/>
-              <a:t>05/08/2017</a:t>
+              <a:t>08/08/2017</a:t>
             </a:fld>
             <a:endParaRPr lang="it-IT"/>
           </a:p>
@@ -884,7 +885,7 @@
           <a:p>
             <a:fld id="{220F67BA-9CF1-48B0-BA9D-7DB2A7FE6C8C}" type="datetimeFigureOut">
               <a:rPr lang="it-IT" smtClean="0"/>
-              <a:t>05/08/2017</a:t>
+              <a:t>08/08/2017</a:t>
             </a:fld>
             <a:endParaRPr lang="it-IT"/>
           </a:p>
@@ -1160,7 +1161,7 @@
           <a:p>
             <a:fld id="{220F67BA-9CF1-48B0-BA9D-7DB2A7FE6C8C}" type="datetimeFigureOut">
               <a:rPr lang="it-IT" smtClean="0"/>
-              <a:t>05/08/2017</a:t>
+              <a:t>08/08/2017</a:t>
             </a:fld>
             <a:endParaRPr lang="it-IT"/>
           </a:p>
@@ -1428,7 +1429,7 @@
           <a:p>
             <a:fld id="{220F67BA-9CF1-48B0-BA9D-7DB2A7FE6C8C}" type="datetimeFigureOut">
               <a:rPr lang="it-IT" smtClean="0"/>
-              <a:t>05/08/2017</a:t>
+              <a:t>08/08/2017</a:t>
             </a:fld>
             <a:endParaRPr lang="it-IT"/>
           </a:p>
@@ -1843,7 +1844,7 @@
           <a:p>
             <a:fld id="{220F67BA-9CF1-48B0-BA9D-7DB2A7FE6C8C}" type="datetimeFigureOut">
               <a:rPr lang="it-IT" smtClean="0"/>
-              <a:t>05/08/2017</a:t>
+              <a:t>08/08/2017</a:t>
             </a:fld>
             <a:endParaRPr lang="it-IT"/>
           </a:p>
@@ -1985,7 +1986,7 @@
           <a:p>
             <a:fld id="{220F67BA-9CF1-48B0-BA9D-7DB2A7FE6C8C}" type="datetimeFigureOut">
               <a:rPr lang="it-IT" smtClean="0"/>
-              <a:t>05/08/2017</a:t>
+              <a:t>08/08/2017</a:t>
             </a:fld>
             <a:endParaRPr lang="it-IT"/>
           </a:p>
@@ -2098,7 +2099,7 @@
           <a:p>
             <a:fld id="{220F67BA-9CF1-48B0-BA9D-7DB2A7FE6C8C}" type="datetimeFigureOut">
               <a:rPr lang="it-IT" smtClean="0"/>
-              <a:t>05/08/2017</a:t>
+              <a:t>08/08/2017</a:t>
             </a:fld>
             <a:endParaRPr lang="it-IT"/>
           </a:p>
@@ -2411,7 +2412,7 @@
           <a:p>
             <a:fld id="{220F67BA-9CF1-48B0-BA9D-7DB2A7FE6C8C}" type="datetimeFigureOut">
               <a:rPr lang="it-IT" smtClean="0"/>
-              <a:t>05/08/2017</a:t>
+              <a:t>08/08/2017</a:t>
             </a:fld>
             <a:endParaRPr lang="it-IT"/>
           </a:p>
@@ -2700,7 +2701,7 @@
           <a:p>
             <a:fld id="{220F67BA-9CF1-48B0-BA9D-7DB2A7FE6C8C}" type="datetimeFigureOut">
               <a:rPr lang="it-IT" smtClean="0"/>
-              <a:t>05/08/2017</a:t>
+              <a:t>08/08/2017</a:t>
             </a:fld>
             <a:endParaRPr lang="it-IT"/>
           </a:p>
@@ -2943,7 +2944,7 @@
           <a:p>
             <a:fld id="{220F67BA-9CF1-48B0-BA9D-7DB2A7FE6C8C}" type="datetimeFigureOut">
               <a:rPr lang="it-IT" smtClean="0"/>
-              <a:t>05/08/2017</a:t>
+              <a:t>08/08/2017</a:t>
             </a:fld>
             <a:endParaRPr lang="it-IT"/>
           </a:p>
@@ -4024,6 +4025,273 @@
 </p:sld>
 </file>
 
+<file path=ppt/slides/slide11.xml><?xml version="1.0" encoding="utf-8"?>
+<p:sld xmlns:a="http://schemas.openxmlformats.org/drawingml/2006/main" xmlns:r="http://schemas.openxmlformats.org/officeDocument/2006/relationships" xmlns:p="http://schemas.openxmlformats.org/presentationml/2006/main">
+  <p:cSld>
+    <p:spTree>
+      <p:nvGrpSpPr>
+        <p:cNvPr id="1" name=""/>
+        <p:cNvGrpSpPr/>
+        <p:nvPr/>
+      </p:nvGrpSpPr>
+      <p:grpSpPr>
+        <a:xfrm>
+          <a:off x="0" y="0"/>
+          <a:ext cx="0" cy="0"/>
+          <a:chOff x="0" y="0"/>
+          <a:chExt cx="0" cy="0"/>
+        </a:xfrm>
+      </p:grpSpPr>
+      <p:sp>
+        <p:nvSpPr>
+          <p:cNvPr id="3" name="Rectangle 2">
+            <a:extLst>
+              <a:ext uri="{FF2B5EF4-FFF2-40B4-BE49-F238E27FC236}">
+                <a16:creationId xmlns:a16="http://schemas.microsoft.com/office/drawing/2014/main" id="{97FB73AA-55D1-4E50-9AD6-E042E94F7664}"/>
+              </a:ext>
+            </a:extLst>
+          </p:cNvPr>
+          <p:cNvSpPr/>
+          <p:nvPr/>
+        </p:nvSpPr>
+        <p:spPr>
+          <a:xfrm>
+            <a:off x="2125934" y="2886055"/>
+            <a:ext cx="7952786" cy="923330"/>
+          </a:xfrm>
+          <a:prstGeom prst="rect">
+            <a:avLst/>
+          </a:prstGeom>
+          <a:noFill/>
+        </p:spPr>
+        <p:txBody>
+          <a:bodyPr wrap="square" lIns="91440" tIns="45720" rIns="91440" bIns="45720">
+            <a:spAutoFit/>
+          </a:bodyPr>
+          <a:lstStyle/>
+          <a:p>
+            <a:pPr algn="ctr"/>
+            <a:r>
+              <a:rPr lang="en-US" sz="5400" spc="2300" dirty="0">
+                <a:ln w="0">
+                  <a:noFill/>
+                </a:ln>
+                <a:latin typeface="Lucida Console" panose="020B0609040504020204" pitchFamily="49" charset="0"/>
+              </a:rPr>
+              <a:t>1234657890</a:t>
+            </a:r>
+          </a:p>
+        </p:txBody>
+      </p:sp>
+      <p:sp>
+        <p:nvSpPr>
+          <p:cNvPr id="4" name="Rectangle 3">
+            <a:extLst>
+              <a:ext uri="{FF2B5EF4-FFF2-40B4-BE49-F238E27FC236}">
+                <a16:creationId xmlns:a16="http://schemas.microsoft.com/office/drawing/2014/main" id="{CCFA68DA-6C63-48ED-BE16-CB3F27BC7D04}"/>
+              </a:ext>
+            </a:extLst>
+          </p:cNvPr>
+          <p:cNvSpPr/>
+          <p:nvPr/>
+        </p:nvSpPr>
+        <p:spPr>
+          <a:xfrm>
+            <a:off x="2113234" y="3561695"/>
+            <a:ext cx="7952786" cy="923330"/>
+          </a:xfrm>
+          <a:prstGeom prst="rect">
+            <a:avLst/>
+          </a:prstGeom>
+          <a:noFill/>
+        </p:spPr>
+        <p:txBody>
+          <a:bodyPr wrap="square" lIns="91440" tIns="45720" rIns="91440" bIns="45720">
+            <a:spAutoFit/>
+          </a:bodyPr>
+          <a:lstStyle/>
+          <a:p>
+            <a:pPr algn="ctr"/>
+            <a:r>
+              <a:rPr lang="en-US" sz="5400" spc="2300" dirty="0">
+                <a:ln w="0">
+                  <a:noFill/>
+                </a:ln>
+                <a:latin typeface="Lucida Console" panose="020B0609040504020204" pitchFamily="49" charset="0"/>
+              </a:rPr>
+              <a:t>QWERTYUIOP</a:t>
+            </a:r>
+          </a:p>
+        </p:txBody>
+      </p:sp>
+      <p:sp>
+        <p:nvSpPr>
+          <p:cNvPr id="5" name="Rectangle 4">
+            <a:extLst>
+              <a:ext uri="{FF2B5EF4-FFF2-40B4-BE49-F238E27FC236}">
+                <a16:creationId xmlns:a16="http://schemas.microsoft.com/office/drawing/2014/main" id="{82685941-73ED-433B-A06D-5E49E5BC4A13}"/>
+              </a:ext>
+            </a:extLst>
+          </p:cNvPr>
+          <p:cNvSpPr/>
+          <p:nvPr/>
+        </p:nvSpPr>
+        <p:spPr>
+          <a:xfrm>
+            <a:off x="1746114" y="4290209"/>
+            <a:ext cx="7952786" cy="923330"/>
+          </a:xfrm>
+          <a:prstGeom prst="rect">
+            <a:avLst/>
+          </a:prstGeom>
+          <a:noFill/>
+        </p:spPr>
+        <p:txBody>
+          <a:bodyPr wrap="square" lIns="91440" tIns="45720" rIns="91440" bIns="45720">
+            <a:spAutoFit/>
+          </a:bodyPr>
+          <a:lstStyle/>
+          <a:p>
+            <a:pPr algn="ctr"/>
+            <a:r>
+              <a:rPr lang="en-US" sz="5400" spc="2300" dirty="0">
+                <a:ln w="0">
+                  <a:noFill/>
+                </a:ln>
+                <a:latin typeface="Lucida Console" panose="020B0609040504020204" pitchFamily="49" charset="0"/>
+              </a:rPr>
+              <a:t>ASDFGHJKL</a:t>
+            </a:r>
+          </a:p>
+        </p:txBody>
+      </p:sp>
+      <p:sp>
+        <p:nvSpPr>
+          <p:cNvPr id="6" name="Rectangle 5">
+            <a:extLst>
+              <a:ext uri="{FF2B5EF4-FFF2-40B4-BE49-F238E27FC236}">
+                <a16:creationId xmlns:a16="http://schemas.microsoft.com/office/drawing/2014/main" id="{2F4796B1-D91A-4AF8-A173-DFDBB68482F9}"/>
+              </a:ext>
+            </a:extLst>
+          </p:cNvPr>
+          <p:cNvSpPr/>
+          <p:nvPr/>
+        </p:nvSpPr>
+        <p:spPr>
+          <a:xfrm>
+            <a:off x="1374094" y="5012184"/>
+            <a:ext cx="7952786" cy="923330"/>
+          </a:xfrm>
+          <a:prstGeom prst="rect">
+            <a:avLst/>
+          </a:prstGeom>
+          <a:noFill/>
+        </p:spPr>
+        <p:txBody>
+          <a:bodyPr wrap="square" lIns="91440" tIns="45720" rIns="91440" bIns="45720">
+            <a:spAutoFit/>
+          </a:bodyPr>
+          <a:lstStyle/>
+          <a:p>
+            <a:pPr algn="ctr"/>
+            <a:r>
+              <a:rPr lang="en-US" sz="5400" spc="2300" dirty="0">
+                <a:ln w="0">
+                  <a:noFill/>
+                </a:ln>
+                <a:latin typeface="Lucida Console" panose="020B0609040504020204" pitchFamily="49" charset="0"/>
+              </a:rPr>
+              <a:t>ZXCVBNM.   </a:t>
+            </a:r>
+          </a:p>
+        </p:txBody>
+      </p:sp>
+      <p:pic>
+        <p:nvPicPr>
+          <p:cNvPr id="8" name="Picture 7">
+            <a:extLst>
+              <a:ext uri="{FF2B5EF4-FFF2-40B4-BE49-F238E27FC236}">
+                <a16:creationId xmlns:a16="http://schemas.microsoft.com/office/drawing/2014/main" id="{E173975F-C33A-44B4-B9E8-81F966397420}"/>
+              </a:ext>
+            </a:extLst>
+          </p:cNvPr>
+          <p:cNvPicPr>
+            <a:picLocks noChangeAspect="1"/>
+          </p:cNvPicPr>
+          <p:nvPr/>
+        </p:nvPicPr>
+        <p:blipFill>
+          <a:blip r:embed="rId2">
+            <a:extLst>
+              <a:ext uri="{28A0092B-C50C-407E-A947-70E740481C1C}">
+                <a14:useLocalDpi xmlns:a14="http://schemas.microsoft.com/office/drawing/2010/main" val="0"/>
+              </a:ext>
+            </a:extLst>
+          </a:blip>
+          <a:stretch>
+            <a:fillRect/>
+          </a:stretch>
+        </p:blipFill>
+        <p:spPr>
+          <a:xfrm>
+            <a:off x="8844045" y="4536403"/>
+            <a:ext cx="627990" cy="439289"/>
+          </a:xfrm>
+          <a:prstGeom prst="rect">
+            <a:avLst/>
+          </a:prstGeom>
+        </p:spPr>
+      </p:pic>
+      <p:sp>
+        <p:nvSpPr>
+          <p:cNvPr id="10" name="TextBox 9">
+            <a:extLst>
+              <a:ext uri="{FF2B5EF4-FFF2-40B4-BE49-F238E27FC236}">
+                <a16:creationId xmlns:a16="http://schemas.microsoft.com/office/drawing/2014/main" id="{B896E24E-D51A-4DE0-ADED-4DD6DABF00AD}"/>
+              </a:ext>
+            </a:extLst>
+          </p:cNvPr>
+          <p:cNvSpPr txBox="1"/>
+          <p:nvPr/>
+        </p:nvSpPr>
+        <p:spPr>
+          <a:xfrm>
+            <a:off x="8065840" y="5243016"/>
+            <a:ext cx="2184400" cy="461665"/>
+          </a:xfrm>
+          <a:prstGeom prst="rect">
+            <a:avLst/>
+          </a:prstGeom>
+          <a:noFill/>
+        </p:spPr>
+        <p:txBody>
+          <a:bodyPr wrap="square" rtlCol="0">
+            <a:spAutoFit/>
+          </a:bodyPr>
+          <a:lstStyle/>
+          <a:p>
+            <a:r>
+              <a:rPr lang="it-IT" sz="2400" dirty="0">
+                <a:latin typeface="Lucida Console" panose="020B0609040504020204" pitchFamily="49" charset="0"/>
+              </a:rPr>
+              <a:t>Confirm</a:t>
+            </a:r>
+          </a:p>
+        </p:txBody>
+      </p:sp>
+    </p:spTree>
+    <p:extLst>
+      <p:ext uri="{BB962C8B-B14F-4D97-AF65-F5344CB8AC3E}">
+        <p14:creationId xmlns:p14="http://schemas.microsoft.com/office/powerpoint/2010/main" val="214941430"/>
+      </p:ext>
+    </p:extLst>
+  </p:cSld>
+  <p:clrMapOvr>
+    <a:masterClrMapping/>
+  </p:clrMapOvr>
+</p:sld>
+</file>
+
 <file path=ppt/slides/slide2.xml><?xml version="1.0" encoding="utf-8"?>
 <p:sld xmlns:a="http://schemas.openxmlformats.org/drawingml/2006/main" xmlns:r="http://schemas.openxmlformats.org/officeDocument/2006/relationships" xmlns:p="http://schemas.openxmlformats.org/presentationml/2006/main">
   <p:cSld>

</xml_diff>

<commit_message>
Aggiunto cappello e combobox (next step gestione delle reference ufficiale)
</commit_message>
<xml_diff>
--- a/interfacce.pptx
+++ b/interfacce.pptx
@@ -275,7 +275,7 @@
           <a:p>
             <a:fld id="{220F67BA-9CF1-48B0-BA9D-7DB2A7FE6C8C}" type="datetimeFigureOut">
               <a:rPr lang="it-IT" smtClean="0"/>
-              <a:t>09/08/2017</a:t>
+              <a:t>10/08/2017</a:t>
             </a:fld>
             <a:endParaRPr lang="it-IT"/>
           </a:p>
@@ -475,7 +475,7 @@
           <a:p>
             <a:fld id="{220F67BA-9CF1-48B0-BA9D-7DB2A7FE6C8C}" type="datetimeFigureOut">
               <a:rPr lang="it-IT" smtClean="0"/>
-              <a:t>09/08/2017</a:t>
+              <a:t>10/08/2017</a:t>
             </a:fld>
             <a:endParaRPr lang="it-IT"/>
           </a:p>
@@ -685,7 +685,7 @@
           <a:p>
             <a:fld id="{220F67BA-9CF1-48B0-BA9D-7DB2A7FE6C8C}" type="datetimeFigureOut">
               <a:rPr lang="it-IT" smtClean="0"/>
-              <a:t>09/08/2017</a:t>
+              <a:t>10/08/2017</a:t>
             </a:fld>
             <a:endParaRPr lang="it-IT"/>
           </a:p>
@@ -885,7 +885,7 @@
           <a:p>
             <a:fld id="{220F67BA-9CF1-48B0-BA9D-7DB2A7FE6C8C}" type="datetimeFigureOut">
               <a:rPr lang="it-IT" smtClean="0"/>
-              <a:t>09/08/2017</a:t>
+              <a:t>10/08/2017</a:t>
             </a:fld>
             <a:endParaRPr lang="it-IT"/>
           </a:p>
@@ -1161,7 +1161,7 @@
           <a:p>
             <a:fld id="{220F67BA-9CF1-48B0-BA9D-7DB2A7FE6C8C}" type="datetimeFigureOut">
               <a:rPr lang="it-IT" smtClean="0"/>
-              <a:t>09/08/2017</a:t>
+              <a:t>10/08/2017</a:t>
             </a:fld>
             <a:endParaRPr lang="it-IT"/>
           </a:p>
@@ -1429,7 +1429,7 @@
           <a:p>
             <a:fld id="{220F67BA-9CF1-48B0-BA9D-7DB2A7FE6C8C}" type="datetimeFigureOut">
               <a:rPr lang="it-IT" smtClean="0"/>
-              <a:t>09/08/2017</a:t>
+              <a:t>10/08/2017</a:t>
             </a:fld>
             <a:endParaRPr lang="it-IT"/>
           </a:p>
@@ -1844,7 +1844,7 @@
           <a:p>
             <a:fld id="{220F67BA-9CF1-48B0-BA9D-7DB2A7FE6C8C}" type="datetimeFigureOut">
               <a:rPr lang="it-IT" smtClean="0"/>
-              <a:t>09/08/2017</a:t>
+              <a:t>10/08/2017</a:t>
             </a:fld>
             <a:endParaRPr lang="it-IT"/>
           </a:p>
@@ -1986,7 +1986,7 @@
           <a:p>
             <a:fld id="{220F67BA-9CF1-48B0-BA9D-7DB2A7FE6C8C}" type="datetimeFigureOut">
               <a:rPr lang="it-IT" smtClean="0"/>
-              <a:t>09/08/2017</a:t>
+              <a:t>10/08/2017</a:t>
             </a:fld>
             <a:endParaRPr lang="it-IT"/>
           </a:p>
@@ -2099,7 +2099,7 @@
           <a:p>
             <a:fld id="{220F67BA-9CF1-48B0-BA9D-7DB2A7FE6C8C}" type="datetimeFigureOut">
               <a:rPr lang="it-IT" smtClean="0"/>
-              <a:t>09/08/2017</a:t>
+              <a:t>10/08/2017</a:t>
             </a:fld>
             <a:endParaRPr lang="it-IT"/>
           </a:p>
@@ -2412,7 +2412,7 @@
           <a:p>
             <a:fld id="{220F67BA-9CF1-48B0-BA9D-7DB2A7FE6C8C}" type="datetimeFigureOut">
               <a:rPr lang="it-IT" smtClean="0"/>
-              <a:t>09/08/2017</a:t>
+              <a:t>10/08/2017</a:t>
             </a:fld>
             <a:endParaRPr lang="it-IT"/>
           </a:p>
@@ -2701,7 +2701,7 @@
           <a:p>
             <a:fld id="{220F67BA-9CF1-48B0-BA9D-7DB2A7FE6C8C}" type="datetimeFigureOut">
               <a:rPr lang="it-IT" smtClean="0"/>
-              <a:t>09/08/2017</a:t>
+              <a:t>10/08/2017</a:t>
             </a:fld>
             <a:endParaRPr lang="it-IT"/>
           </a:p>
@@ -2944,7 +2944,7 @@
           <a:p>
             <a:fld id="{220F67BA-9CF1-48B0-BA9D-7DB2A7FE6C8C}" type="datetimeFigureOut">
               <a:rPr lang="it-IT" smtClean="0"/>
-              <a:t>09/08/2017</a:t>
+              <a:t>10/08/2017</a:t>
             </a:fld>
             <a:endParaRPr lang="it-IT"/>
           </a:p>
@@ -5745,6 +5745,60 @@
           </a:p>
         </p:txBody>
       </p:sp>
+      <p:sp>
+        <p:nvSpPr>
+          <p:cNvPr id="10" name="Isosceles Triangle 9">
+            <a:extLst>
+              <a:ext uri="{FF2B5EF4-FFF2-40B4-BE49-F238E27FC236}">
+                <a16:creationId xmlns:a16="http://schemas.microsoft.com/office/drawing/2014/main" id="{8C091EC7-75DF-420F-8068-19128D8DACE5}"/>
+              </a:ext>
+            </a:extLst>
+          </p:cNvPr>
+          <p:cNvSpPr/>
+          <p:nvPr/>
+        </p:nvSpPr>
+        <p:spPr>
+          <a:xfrm rot="10800000">
+            <a:off x="6555971" y="2569901"/>
+            <a:ext cx="370226" cy="319160"/>
+          </a:xfrm>
+          <a:prstGeom prst="triangle">
+            <a:avLst/>
+          </a:prstGeom>
+          <a:noFill/>
+          <a:ln w="57150">
+            <a:solidFill>
+              <a:schemeClr val="bg2">
+                <a:lumMod val="50000"/>
+              </a:schemeClr>
+            </a:solidFill>
+          </a:ln>
+        </p:spPr>
+        <p:style>
+          <a:lnRef idx="2">
+            <a:schemeClr val="accent1">
+              <a:shade val="50000"/>
+            </a:schemeClr>
+          </a:lnRef>
+          <a:fillRef idx="1">
+            <a:schemeClr val="accent1"/>
+          </a:fillRef>
+          <a:effectRef idx="0">
+            <a:schemeClr val="accent1"/>
+          </a:effectRef>
+          <a:fontRef idx="minor">
+            <a:schemeClr val="lt1"/>
+          </a:fontRef>
+        </p:style>
+        <p:txBody>
+          <a:bodyPr rtlCol="0" anchor="ctr"/>
+          <a:lstStyle/>
+          <a:p>
+            <a:pPr algn="ctr"/>
+            <a:endParaRPr lang="it-IT"/>
+          </a:p>
+        </p:txBody>
+      </p:sp>
     </p:spTree>
     <p:extLst>
       <p:ext uri="{BB962C8B-B14F-4D97-AF65-F5344CB8AC3E}">

</xml_diff>